<commit_message>
Moving figures, editting intro and afactor.
</commit_message>
<xml_diff>
--- a/figures/PES.pptx
+++ b/figures/PES.pptx
@@ -2972,7 +2972,7 @@
         </p:nvCxnSpPr>
         <p:spPr>
           <a:xfrm flipV="1">
-            <a:off x="1303867" y="1422400"/>
+            <a:off x="2450496" y="2206172"/>
             <a:ext cx="0" cy="3725333"/>
           </a:xfrm>
           <a:prstGeom prst="straightConnector1">
@@ -3005,7 +3005,7 @@
         </p:nvCxnSpPr>
         <p:spPr>
           <a:xfrm>
-            <a:off x="1303867" y="5147733"/>
+            <a:off x="2450496" y="5931505"/>
             <a:ext cx="6790267" cy="0"/>
           </a:xfrm>
           <a:prstGeom prst="straightConnector1">
@@ -3038,7 +3038,7 @@
         </p:nvSpPr>
         <p:spPr>
           <a:xfrm>
-            <a:off x="3600450" y="5147733"/>
+            <a:off x="4747079" y="5931505"/>
             <a:ext cx="2292349" cy="400110"/>
           </a:xfrm>
           <a:prstGeom prst="rect">
@@ -3071,7 +3071,7 @@
         </p:nvSpPr>
         <p:spPr>
           <a:xfrm rot="16200000">
-            <a:off x="663860" y="3085011"/>
+            <a:off x="1810489" y="3868783"/>
             <a:ext cx="910682" cy="400110"/>
           </a:xfrm>
           <a:prstGeom prst="rect">
@@ -3100,7 +3100,7 @@
         </p:nvSpPr>
         <p:spPr>
           <a:xfrm>
-            <a:off x="1435100" y="1576326"/>
+            <a:off x="2581729" y="2360098"/>
             <a:ext cx="6477000" cy="3393921"/>
           </a:xfrm>
           <a:custGeom>
@@ -3197,7 +3197,7 @@
         </p:nvCxnSpPr>
         <p:spPr>
           <a:xfrm>
-            <a:off x="2374900" y="3321050"/>
+            <a:off x="3521529" y="4104822"/>
             <a:ext cx="2527300" cy="0"/>
           </a:xfrm>
           <a:prstGeom prst="line">
@@ -3230,7 +3230,7 @@
         </p:nvCxnSpPr>
         <p:spPr>
           <a:xfrm>
-            <a:off x="4104640" y="4977867"/>
+            <a:off x="5251269" y="5761639"/>
             <a:ext cx="2527300" cy="0"/>
           </a:xfrm>
           <a:prstGeom prst="line">
@@ -3263,7 +3263,7 @@
         </p:nvCxnSpPr>
         <p:spPr>
           <a:xfrm flipV="1">
-            <a:off x="4191000" y="1576326"/>
+            <a:off x="5337629" y="2360098"/>
             <a:ext cx="0" cy="1744724"/>
           </a:xfrm>
           <a:prstGeom prst="straightConnector1">
@@ -3299,7 +3299,7 @@
         </p:nvCxnSpPr>
         <p:spPr>
           <a:xfrm>
-            <a:off x="4953000" y="3321050"/>
+            <a:off x="6099629" y="4104822"/>
             <a:ext cx="0" cy="1656817"/>
           </a:xfrm>
           <a:prstGeom prst="straightConnector1">
@@ -3335,7 +3335,7 @@
         </p:nvSpPr>
         <p:spPr>
           <a:xfrm>
-            <a:off x="2230967" y="2943118"/>
+            <a:off x="3377596" y="3726890"/>
             <a:ext cx="368300" cy="377932"/>
           </a:xfrm>
           <a:prstGeom prst="rect">
@@ -3364,7 +3364,7 @@
         </p:nvSpPr>
         <p:spPr>
           <a:xfrm>
-            <a:off x="4129013" y="1576325"/>
+            <a:off x="5275642" y="2360097"/>
             <a:ext cx="368300" cy="377932"/>
           </a:xfrm>
           <a:prstGeom prst="rect">
@@ -3393,7 +3393,7 @@
         </p:nvSpPr>
         <p:spPr>
           <a:xfrm>
-            <a:off x="6563634" y="4649410"/>
+            <a:off x="7710263" y="5433182"/>
             <a:ext cx="368300" cy="377932"/>
           </a:xfrm>
           <a:prstGeom prst="rect">
@@ -3424,7 +3424,7 @@
             </p:nvSpPr>
             <p:spPr>
               <a:xfrm>
-                <a:off x="4237446" y="2514959"/>
+                <a:off x="5384075" y="3298731"/>
                 <a:ext cx="509178" cy="314766"/>
               </a:xfrm>
               <a:prstGeom prst="rect">
@@ -3494,7 +3494,7 @@
             </p:nvSpPr>
             <p:spPr>
               <a:xfrm>
-                <a:off x="4237446" y="2514959"/>
+                <a:off x="5384075" y="3298731"/>
                 <a:ext cx="509178" cy="314766"/>
               </a:xfrm>
               <a:prstGeom prst="rect">
@@ -3503,7 +3503,7 @@
               <a:blipFill>
                 <a:blip r:embed="rId2"/>
                 <a:stretch>
-                  <a:fillRect l="-10714" t="-3922" r="-7143" b="-7843"/>
+                  <a:fillRect l="-10714" t="-3846" r="-7143" b="-7692"/>
                 </a:stretch>
               </a:blipFill>
             </p:spPr>
@@ -3532,7 +3532,7 @@
             </p:nvSpPr>
             <p:spPr>
               <a:xfrm>
-                <a:off x="4443822" y="3988266"/>
+                <a:off x="5590451" y="4772038"/>
                 <a:ext cx="402354" cy="307777"/>
               </a:xfrm>
               <a:prstGeom prst="rect">
@@ -3583,7 +3583,7 @@
             </p:nvSpPr>
             <p:spPr>
               <a:xfrm>
-                <a:off x="4443822" y="3988266"/>
+                <a:off x="5590451" y="4772038"/>
                 <a:ext cx="402354" cy="307777"/>
               </a:xfrm>
               <a:prstGeom prst="rect">
@@ -3592,7 +3592,7 @@
               <a:blipFill>
                 <a:blip r:embed="rId3"/>
                 <a:stretch>
-                  <a:fillRect l="-15152" r="-13636" b="-5882"/>
+                  <a:fillRect l="-13636" r="-15152" b="-6000"/>
                 </a:stretch>
               </a:blipFill>
             </p:spPr>

</xml_diff>

<commit_message>
Revised introduction after conversation with Gino.
</commit_message>
<xml_diff>
--- a/figures/PES.pptx
+++ b/figures/PES.pptx
@@ -104,6 +104,11 @@
       </a:defRPr>
     </a:lvl9pPr>
   </p:defaultTextStyle>
+  <p:extLst>
+    <p:ext uri="{EFAFB233-063F-42B5-8137-9DF3F51BA10A}">
+      <p15:sldGuideLst xmlns:p15="http://schemas.microsoft.com/office/powerpoint/2012/main"/>
+    </p:ext>
+  </p:extLst>
 </p:presentation>
 </file>
 
@@ -152,7 +157,6 @@
               <a:rPr lang="en-US"/>
               <a:t>Click to edit Master title style</a:t>
             </a:r>
-            <a:endParaRPr lang="en-US"/>
           </a:p>
         </p:txBody>
       </p:sp>
@@ -217,7 +221,6 @@
               <a:rPr lang="en-US"/>
               <a:t>Click to edit Master subtitle style</a:t>
             </a:r>
-            <a:endParaRPr lang="en-US"/>
           </a:p>
         </p:txBody>
       </p:sp>
@@ -238,7 +241,7 @@
           <a:p>
             <a:fld id="{4798B9AD-B36C-47C8-A915-85689EDC7940}" type="datetimeFigureOut">
               <a:rPr lang="en-US" smtClean="0"/>
-              <a:t>5/16/2017</a:t>
+              <a:t>5/27/2017</a:t>
             </a:fld>
             <a:endParaRPr lang="en-US"/>
           </a:p>
@@ -335,7 +338,6 @@
               <a:rPr lang="en-US"/>
               <a:t>Click to edit Master title style</a:t>
             </a:r>
-            <a:endParaRPr lang="en-US"/>
           </a:p>
         </p:txBody>
       </p:sp>
@@ -387,7 +389,6 @@
               <a:rPr lang="en-US"/>
               <a:t>Fifth level</a:t>
             </a:r>
-            <a:endParaRPr lang="en-US"/>
           </a:p>
         </p:txBody>
       </p:sp>
@@ -408,7 +409,7 @@
           <a:p>
             <a:fld id="{4798B9AD-B36C-47C8-A915-85689EDC7940}" type="datetimeFigureOut">
               <a:rPr lang="en-US" smtClean="0"/>
-              <a:t>5/16/2017</a:t>
+              <a:t>5/27/2017</a:t>
             </a:fld>
             <a:endParaRPr lang="en-US"/>
           </a:p>
@@ -510,7 +511,6 @@
               <a:rPr lang="en-US"/>
               <a:t>Click to edit Master title style</a:t>
             </a:r>
-            <a:endParaRPr lang="en-US"/>
           </a:p>
         </p:txBody>
       </p:sp>
@@ -567,7 +567,6 @@
               <a:rPr lang="en-US"/>
               <a:t>Fifth level</a:t>
             </a:r>
-            <a:endParaRPr lang="en-US"/>
           </a:p>
         </p:txBody>
       </p:sp>
@@ -588,7 +587,7 @@
           <a:p>
             <a:fld id="{4798B9AD-B36C-47C8-A915-85689EDC7940}" type="datetimeFigureOut">
               <a:rPr lang="en-US" smtClean="0"/>
-              <a:t>5/16/2017</a:t>
+              <a:t>5/27/2017</a:t>
             </a:fld>
             <a:endParaRPr lang="en-US"/>
           </a:p>
@@ -685,7 +684,6 @@
               <a:rPr lang="en-US"/>
               <a:t>Click to edit Master title style</a:t>
             </a:r>
-            <a:endParaRPr lang="en-US"/>
           </a:p>
         </p:txBody>
       </p:sp>
@@ -737,7 +735,6 @@
               <a:rPr lang="en-US"/>
               <a:t>Fifth level</a:t>
             </a:r>
-            <a:endParaRPr lang="en-US"/>
           </a:p>
         </p:txBody>
       </p:sp>
@@ -758,7 +755,7 @@
           <a:p>
             <a:fld id="{4798B9AD-B36C-47C8-A915-85689EDC7940}" type="datetimeFigureOut">
               <a:rPr lang="en-US" smtClean="0"/>
-              <a:t>5/16/2017</a:t>
+              <a:t>5/27/2017</a:t>
             </a:fld>
             <a:endParaRPr lang="en-US"/>
           </a:p>
@@ -864,7 +861,6 @@
               <a:rPr lang="en-US"/>
               <a:t>Click to edit Master title style</a:t>
             </a:r>
-            <a:endParaRPr lang="en-US"/>
           </a:p>
         </p:txBody>
       </p:sp>
@@ -1004,7 +1000,7 @@
           <a:p>
             <a:fld id="{4798B9AD-B36C-47C8-A915-85689EDC7940}" type="datetimeFigureOut">
               <a:rPr lang="en-US" smtClean="0"/>
-              <a:t>5/16/2017</a:t>
+              <a:t>5/27/2017</a:t>
             </a:fld>
             <a:endParaRPr lang="en-US"/>
           </a:p>
@@ -1101,7 +1097,6 @@
               <a:rPr lang="en-US"/>
               <a:t>Click to edit Master title style</a:t>
             </a:r>
-            <a:endParaRPr lang="en-US"/>
           </a:p>
         </p:txBody>
       </p:sp>
@@ -1158,7 +1153,6 @@
               <a:rPr lang="en-US"/>
               <a:t>Fifth level</a:t>
             </a:r>
-            <a:endParaRPr lang="en-US"/>
           </a:p>
         </p:txBody>
       </p:sp>
@@ -1215,7 +1209,6 @@
               <a:rPr lang="en-US"/>
               <a:t>Fifth level</a:t>
             </a:r>
-            <a:endParaRPr lang="en-US"/>
           </a:p>
         </p:txBody>
       </p:sp>
@@ -1236,7 +1229,7 @@
           <a:p>
             <a:fld id="{4798B9AD-B36C-47C8-A915-85689EDC7940}" type="datetimeFigureOut">
               <a:rPr lang="en-US" smtClean="0"/>
-              <a:t>5/16/2017</a:t>
+              <a:t>5/27/2017</a:t>
             </a:fld>
             <a:endParaRPr lang="en-US"/>
           </a:p>
@@ -1338,7 +1331,6 @@
               <a:rPr lang="en-US"/>
               <a:t>Click to edit Master title style</a:t>
             </a:r>
-            <a:endParaRPr lang="en-US"/>
           </a:p>
         </p:txBody>
       </p:sp>
@@ -1460,7 +1452,6 @@
               <a:rPr lang="en-US"/>
               <a:t>Fifth level</a:t>
             </a:r>
-            <a:endParaRPr lang="en-US"/>
           </a:p>
         </p:txBody>
       </p:sp>
@@ -1582,7 +1573,6 @@
               <a:rPr lang="en-US"/>
               <a:t>Fifth level</a:t>
             </a:r>
-            <a:endParaRPr lang="en-US"/>
           </a:p>
         </p:txBody>
       </p:sp>
@@ -1603,7 +1593,7 @@
           <a:p>
             <a:fld id="{4798B9AD-B36C-47C8-A915-85689EDC7940}" type="datetimeFigureOut">
               <a:rPr lang="en-US" smtClean="0"/>
-              <a:t>5/16/2017</a:t>
+              <a:t>5/27/2017</a:t>
             </a:fld>
             <a:endParaRPr lang="en-US"/>
           </a:p>
@@ -1700,7 +1690,6 @@
               <a:rPr lang="en-US"/>
               <a:t>Click to edit Master title style</a:t>
             </a:r>
-            <a:endParaRPr lang="en-US"/>
           </a:p>
         </p:txBody>
       </p:sp>
@@ -1721,7 +1710,7 @@
           <a:p>
             <a:fld id="{4798B9AD-B36C-47C8-A915-85689EDC7940}" type="datetimeFigureOut">
               <a:rPr lang="en-US" smtClean="0"/>
-              <a:t>5/16/2017</a:t>
+              <a:t>5/27/2017</a:t>
             </a:fld>
             <a:endParaRPr lang="en-US"/>
           </a:p>
@@ -1816,7 +1805,7 @@
           <a:p>
             <a:fld id="{4798B9AD-B36C-47C8-A915-85689EDC7940}" type="datetimeFigureOut">
               <a:rPr lang="en-US" smtClean="0"/>
-              <a:t>5/16/2017</a:t>
+              <a:t>5/27/2017</a:t>
             </a:fld>
             <a:endParaRPr lang="en-US"/>
           </a:p>
@@ -1922,7 +1911,6 @@
               <a:rPr lang="en-US"/>
               <a:t>Click to edit Master title style</a:t>
             </a:r>
-            <a:endParaRPr lang="en-US"/>
           </a:p>
         </p:txBody>
       </p:sp>
@@ -2007,7 +1995,6 @@
               <a:rPr lang="en-US"/>
               <a:t>Fifth level</a:t>
             </a:r>
-            <a:endParaRPr lang="en-US"/>
           </a:p>
         </p:txBody>
       </p:sp>
@@ -2093,7 +2080,7 @@
           <a:p>
             <a:fld id="{4798B9AD-B36C-47C8-A915-85689EDC7940}" type="datetimeFigureOut">
               <a:rPr lang="en-US" smtClean="0"/>
-              <a:t>5/16/2017</a:t>
+              <a:t>5/27/2017</a:t>
             </a:fld>
             <a:endParaRPr lang="en-US"/>
           </a:p>
@@ -2199,7 +2186,6 @@
               <a:rPr lang="en-US"/>
               <a:t>Click to edit Master title style</a:t>
             </a:r>
-            <a:endParaRPr lang="en-US"/>
           </a:p>
         </p:txBody>
       </p:sp>
@@ -2346,7 +2332,7 @@
           <a:p>
             <a:fld id="{4798B9AD-B36C-47C8-A915-85689EDC7940}" type="datetimeFigureOut">
               <a:rPr lang="en-US" smtClean="0"/>
-              <a:t>5/16/2017</a:t>
+              <a:t>5/27/2017</a:t>
             </a:fld>
             <a:endParaRPr lang="en-US"/>
           </a:p>
@@ -2458,7 +2444,6 @@
               <a:rPr lang="en-US"/>
               <a:t>Click to edit Master title style</a:t>
             </a:r>
-            <a:endParaRPr lang="en-US"/>
           </a:p>
         </p:txBody>
       </p:sp>
@@ -2520,7 +2505,6 @@
               <a:rPr lang="en-US"/>
               <a:t>Fifth level</a:t>
             </a:r>
-            <a:endParaRPr lang="en-US"/>
           </a:p>
         </p:txBody>
       </p:sp>
@@ -2559,7 +2543,7 @@
           <a:p>
             <a:fld id="{4798B9AD-B36C-47C8-A915-85689EDC7940}" type="datetimeFigureOut">
               <a:rPr lang="en-US" smtClean="0"/>
-              <a:t>5/16/2017</a:t>
+              <a:t>5/27/2017</a:t>
             </a:fld>
             <a:endParaRPr lang="en-US"/>
           </a:p>
@@ -3006,7 +2990,7 @@
         <p:spPr>
           <a:xfrm>
             <a:off x="2450496" y="5931505"/>
-            <a:ext cx="6790267" cy="0"/>
+            <a:ext cx="9451218" cy="0"/>
           </a:xfrm>
           <a:prstGeom prst="straightConnector1">
             <a:avLst/>
@@ -3038,8 +3022,8 @@
         </p:nvSpPr>
         <p:spPr>
           <a:xfrm>
-            <a:off x="4747079" y="5931505"/>
-            <a:ext cx="2292349" cy="400110"/>
+            <a:off x="6130697" y="5948335"/>
+            <a:ext cx="2579461" cy="461665"/>
           </a:xfrm>
           <a:prstGeom prst="rect">
             <a:avLst/>
@@ -3053,11 +3037,11 @@
           <a:lstStyle/>
           <a:p>
             <a:r>
+              <a:rPr lang="en-US" sz="2400" b="1" dirty="0"/>
+              <a:t>Reaction</a:t>
+            </a:r>
+            <a:r>
               <a:rPr lang="en-US" sz="2000" b="1" dirty="0"/>
-              <a:t>Reaction</a:t>
-            </a:r>
-            <a:r>
-              <a:rPr lang="en-US" b="1" dirty="0"/>
               <a:t> Coordinate</a:t>
             </a:r>
           </a:p>
@@ -3071,8 +3055,8 @@
         </p:nvSpPr>
         <p:spPr>
           <a:xfrm rot="16200000">
-            <a:off x="1810489" y="3868783"/>
-            <a:ext cx="910682" cy="400110"/>
+            <a:off x="1592449" y="3838005"/>
+            <a:ext cx="1225447" cy="461665"/>
           </a:xfrm>
           <a:prstGeom prst="rect">
             <a:avLst/>
@@ -3086,9 +3070,10 @@
           <a:lstStyle/>
           <a:p>
             <a:r>
-              <a:rPr lang="en-US" sz="2000" b="1" dirty="0"/>
+              <a:rPr lang="en-US" sz="2400" b="1" dirty="0"/>
               <a:t>Energy</a:t>
             </a:r>
+            <a:endParaRPr lang="en-US" sz="2000" b="1" dirty="0"/>
           </a:p>
         </p:txBody>
       </p:sp>
@@ -3100,8 +3085,8 @@
         </p:nvSpPr>
         <p:spPr>
           <a:xfrm>
-            <a:off x="2581729" y="2360098"/>
-            <a:ext cx="6477000" cy="3393921"/>
+            <a:off x="2668814" y="2360566"/>
+            <a:ext cx="9044939" cy="3281042"/>
           </a:xfrm>
           <a:custGeom>
             <a:avLst/>
@@ -3116,6 +3101,354 @@
               <a:gd name="connsiteY3" fmla="*/ 3186174 h 3393921"/>
               <a:gd name="connsiteX4" fmla="*/ 4406900 w 4406900"/>
               <a:gd name="connsiteY4" fmla="*/ 2830574 h 3393921"/>
+              <a:gd name="connsiteX0" fmla="*/ 0 w 4406900"/>
+              <a:gd name="connsiteY0" fmla="*/ 1027761 h 3394508"/>
+              <a:gd name="connsiteX1" fmla="*/ 198743 w 4406900"/>
+              <a:gd name="connsiteY1" fmla="*/ 1312603 h 3394508"/>
+              <a:gd name="connsiteX2" fmla="*/ 800100 w 4406900"/>
+              <a:gd name="connsiteY2" fmla="*/ 1700861 h 3394508"/>
+              <a:gd name="connsiteX3" fmla="*/ 1955800 w 4406900"/>
+              <a:gd name="connsiteY3" fmla="*/ 24461 h 3394508"/>
+              <a:gd name="connsiteX4" fmla="*/ 3238500 w 4406900"/>
+              <a:gd name="connsiteY4" fmla="*/ 3186761 h 3394508"/>
+              <a:gd name="connsiteX5" fmla="*/ 4406900 w 4406900"/>
+              <a:gd name="connsiteY5" fmla="*/ 2831161 h 3394508"/>
+              <a:gd name="connsiteX0" fmla="*/ 0 w 5137680"/>
+              <a:gd name="connsiteY0" fmla="*/ 1303533 h 3394508"/>
+              <a:gd name="connsiteX1" fmla="*/ 929523 w 5137680"/>
+              <a:gd name="connsiteY1" fmla="*/ 1312603 h 3394508"/>
+              <a:gd name="connsiteX2" fmla="*/ 1530880 w 5137680"/>
+              <a:gd name="connsiteY2" fmla="*/ 1700861 h 3394508"/>
+              <a:gd name="connsiteX3" fmla="*/ 2686580 w 5137680"/>
+              <a:gd name="connsiteY3" fmla="*/ 24461 h 3394508"/>
+              <a:gd name="connsiteX4" fmla="*/ 3969280 w 5137680"/>
+              <a:gd name="connsiteY4" fmla="*/ 3186761 h 3394508"/>
+              <a:gd name="connsiteX5" fmla="*/ 5137680 w 5137680"/>
+              <a:gd name="connsiteY5" fmla="*/ 2831161 h 3394508"/>
+              <a:gd name="connsiteX0" fmla="*/ 0 w 5246309"/>
+              <a:gd name="connsiteY0" fmla="*/ 708447 h 3394508"/>
+              <a:gd name="connsiteX1" fmla="*/ 1038152 w 5246309"/>
+              <a:gd name="connsiteY1" fmla="*/ 1312603 h 3394508"/>
+              <a:gd name="connsiteX2" fmla="*/ 1639509 w 5246309"/>
+              <a:gd name="connsiteY2" fmla="*/ 1700861 h 3394508"/>
+              <a:gd name="connsiteX3" fmla="*/ 2795209 w 5246309"/>
+              <a:gd name="connsiteY3" fmla="*/ 24461 h 3394508"/>
+              <a:gd name="connsiteX4" fmla="*/ 4077909 w 5246309"/>
+              <a:gd name="connsiteY4" fmla="*/ 3186761 h 3394508"/>
+              <a:gd name="connsiteX5" fmla="*/ 5246309 w 5246309"/>
+              <a:gd name="connsiteY5" fmla="*/ 2831161 h 3394508"/>
+              <a:gd name="connsiteX0" fmla="*/ 0 w 5246309"/>
+              <a:gd name="connsiteY0" fmla="*/ 707420 h 3393481"/>
+              <a:gd name="connsiteX1" fmla="*/ 801142 w 5246309"/>
+              <a:gd name="connsiteY1" fmla="*/ 803576 h 3393481"/>
+              <a:gd name="connsiteX2" fmla="*/ 1639509 w 5246309"/>
+              <a:gd name="connsiteY2" fmla="*/ 1699834 h 3393481"/>
+              <a:gd name="connsiteX3" fmla="*/ 2795209 w 5246309"/>
+              <a:gd name="connsiteY3" fmla="*/ 23434 h 3393481"/>
+              <a:gd name="connsiteX4" fmla="*/ 4077909 w 5246309"/>
+              <a:gd name="connsiteY4" fmla="*/ 3185734 h 3393481"/>
+              <a:gd name="connsiteX5" fmla="*/ 5246309 w 5246309"/>
+              <a:gd name="connsiteY5" fmla="*/ 2830134 h 3393481"/>
+              <a:gd name="connsiteX0" fmla="*/ 0 w 5246309"/>
+              <a:gd name="connsiteY0" fmla="*/ 707420 h 3393481"/>
+              <a:gd name="connsiteX1" fmla="*/ 801142 w 5246309"/>
+              <a:gd name="connsiteY1" fmla="*/ 803576 h 3393481"/>
+              <a:gd name="connsiteX2" fmla="*/ 1639509 w 5246309"/>
+              <a:gd name="connsiteY2" fmla="*/ 1699834 h 3393481"/>
+              <a:gd name="connsiteX3" fmla="*/ 2795209 w 5246309"/>
+              <a:gd name="connsiteY3" fmla="*/ 23434 h 3393481"/>
+              <a:gd name="connsiteX4" fmla="*/ 4077909 w 5246309"/>
+              <a:gd name="connsiteY4" fmla="*/ 3185734 h 3393481"/>
+              <a:gd name="connsiteX5" fmla="*/ 5246309 w 5246309"/>
+              <a:gd name="connsiteY5" fmla="*/ 2830134 h 3393481"/>
+              <a:gd name="connsiteX0" fmla="*/ 0 w 5246309"/>
+              <a:gd name="connsiteY0" fmla="*/ 707761 h 3393822"/>
+              <a:gd name="connsiteX1" fmla="*/ 741889 w 5246309"/>
+              <a:gd name="connsiteY1" fmla="*/ 978089 h 3393822"/>
+              <a:gd name="connsiteX2" fmla="*/ 1639509 w 5246309"/>
+              <a:gd name="connsiteY2" fmla="*/ 1700175 h 3393822"/>
+              <a:gd name="connsiteX3" fmla="*/ 2795209 w 5246309"/>
+              <a:gd name="connsiteY3" fmla="*/ 23775 h 3393822"/>
+              <a:gd name="connsiteX4" fmla="*/ 4077909 w 5246309"/>
+              <a:gd name="connsiteY4" fmla="*/ 3186075 h 3393822"/>
+              <a:gd name="connsiteX5" fmla="*/ 5246309 w 5246309"/>
+              <a:gd name="connsiteY5" fmla="*/ 2830475 h 3393822"/>
+              <a:gd name="connsiteX0" fmla="*/ 0 w 5246309"/>
+              <a:gd name="connsiteY0" fmla="*/ 707363 h 3393424"/>
+              <a:gd name="connsiteX1" fmla="*/ 1048026 w 5246309"/>
+              <a:gd name="connsiteY1" fmla="*/ 774491 h 3393424"/>
+              <a:gd name="connsiteX2" fmla="*/ 1639509 w 5246309"/>
+              <a:gd name="connsiteY2" fmla="*/ 1699777 h 3393424"/>
+              <a:gd name="connsiteX3" fmla="*/ 2795209 w 5246309"/>
+              <a:gd name="connsiteY3" fmla="*/ 23377 h 3393424"/>
+              <a:gd name="connsiteX4" fmla="*/ 4077909 w 5246309"/>
+              <a:gd name="connsiteY4" fmla="*/ 3185677 h 3393424"/>
+              <a:gd name="connsiteX5" fmla="*/ 5246309 w 5246309"/>
+              <a:gd name="connsiteY5" fmla="*/ 2830077 h 3393424"/>
+              <a:gd name="connsiteX0" fmla="*/ 0 w 5414190"/>
+              <a:gd name="connsiteY0" fmla="*/ 707363 h 3287776"/>
+              <a:gd name="connsiteX1" fmla="*/ 1048026 w 5414190"/>
+              <a:gd name="connsiteY1" fmla="*/ 774491 h 3287776"/>
+              <a:gd name="connsiteX2" fmla="*/ 1639509 w 5414190"/>
+              <a:gd name="connsiteY2" fmla="*/ 1699777 h 3287776"/>
+              <a:gd name="connsiteX3" fmla="*/ 2795209 w 5414190"/>
+              <a:gd name="connsiteY3" fmla="*/ 23377 h 3287776"/>
+              <a:gd name="connsiteX4" fmla="*/ 4077909 w 5414190"/>
+              <a:gd name="connsiteY4" fmla="*/ 3185677 h 3287776"/>
+              <a:gd name="connsiteX5" fmla="*/ 5414190 w 5414190"/>
+              <a:gd name="connsiteY5" fmla="*/ 1973734 h 3287776"/>
+              <a:gd name="connsiteX0" fmla="*/ 0 w 5454253"/>
+              <a:gd name="connsiteY0" fmla="*/ 707363 h 3287776"/>
+              <a:gd name="connsiteX1" fmla="*/ 1048026 w 5454253"/>
+              <a:gd name="connsiteY1" fmla="*/ 774491 h 3287776"/>
+              <a:gd name="connsiteX2" fmla="*/ 1639509 w 5454253"/>
+              <a:gd name="connsiteY2" fmla="*/ 1699777 h 3287776"/>
+              <a:gd name="connsiteX3" fmla="*/ 2795209 w 5454253"/>
+              <a:gd name="connsiteY3" fmla="*/ 23377 h 3287776"/>
+              <a:gd name="connsiteX4" fmla="*/ 4077909 w 5454253"/>
+              <a:gd name="connsiteY4" fmla="*/ 3185677 h 3287776"/>
+              <a:gd name="connsiteX5" fmla="*/ 5414190 w 5454253"/>
+              <a:gd name="connsiteY5" fmla="*/ 1973734 h 3287776"/>
+              <a:gd name="connsiteX6" fmla="*/ 5096944 w 5454253"/>
+              <a:gd name="connsiteY6" fmla="*/ 2472662 h 3287776"/>
+              <a:gd name="connsiteX0" fmla="*/ 0 w 6148605"/>
+              <a:gd name="connsiteY0" fmla="*/ 707363 h 3287776"/>
+              <a:gd name="connsiteX1" fmla="*/ 1048026 w 6148605"/>
+              <a:gd name="connsiteY1" fmla="*/ 774491 h 3287776"/>
+              <a:gd name="connsiteX2" fmla="*/ 1639509 w 6148605"/>
+              <a:gd name="connsiteY2" fmla="*/ 1699777 h 3287776"/>
+              <a:gd name="connsiteX3" fmla="*/ 2795209 w 6148605"/>
+              <a:gd name="connsiteY3" fmla="*/ 23377 h 3287776"/>
+              <a:gd name="connsiteX4" fmla="*/ 4077909 w 6148605"/>
+              <a:gd name="connsiteY4" fmla="*/ 3185677 h 3287776"/>
+              <a:gd name="connsiteX5" fmla="*/ 5414190 w 6148605"/>
+              <a:gd name="connsiteY5" fmla="*/ 1973734 h 3287776"/>
+              <a:gd name="connsiteX6" fmla="*/ 6143737 w 6148605"/>
+              <a:gd name="connsiteY6" fmla="*/ 2008205 h 3287776"/>
+              <a:gd name="connsiteX0" fmla="*/ 0 w 6148605"/>
+              <a:gd name="connsiteY0" fmla="*/ 707363 h 3287776"/>
+              <a:gd name="connsiteX1" fmla="*/ 1048026 w 6148605"/>
+              <a:gd name="connsiteY1" fmla="*/ 774491 h 3287776"/>
+              <a:gd name="connsiteX2" fmla="*/ 1639509 w 6148605"/>
+              <a:gd name="connsiteY2" fmla="*/ 1699777 h 3287776"/>
+              <a:gd name="connsiteX3" fmla="*/ 2795209 w 6148605"/>
+              <a:gd name="connsiteY3" fmla="*/ 23377 h 3287776"/>
+              <a:gd name="connsiteX4" fmla="*/ 4077909 w 6148605"/>
+              <a:gd name="connsiteY4" fmla="*/ 3185677 h 3287776"/>
+              <a:gd name="connsiteX5" fmla="*/ 5414190 w 6148605"/>
+              <a:gd name="connsiteY5" fmla="*/ 1973734 h 3287776"/>
+              <a:gd name="connsiteX6" fmla="*/ 6143737 w 6148605"/>
+              <a:gd name="connsiteY6" fmla="*/ 1979176 h 3287776"/>
+              <a:gd name="connsiteX0" fmla="*/ 0 w 5933642"/>
+              <a:gd name="connsiteY0" fmla="*/ 707363 h 3287776"/>
+              <a:gd name="connsiteX1" fmla="*/ 1048026 w 5933642"/>
+              <a:gd name="connsiteY1" fmla="*/ 774491 h 3287776"/>
+              <a:gd name="connsiteX2" fmla="*/ 1639509 w 5933642"/>
+              <a:gd name="connsiteY2" fmla="*/ 1699777 h 3287776"/>
+              <a:gd name="connsiteX3" fmla="*/ 2795209 w 5933642"/>
+              <a:gd name="connsiteY3" fmla="*/ 23377 h 3287776"/>
+              <a:gd name="connsiteX4" fmla="*/ 4077909 w 5933642"/>
+              <a:gd name="connsiteY4" fmla="*/ 3185677 h 3287776"/>
+              <a:gd name="connsiteX5" fmla="*/ 5414190 w 5933642"/>
+              <a:gd name="connsiteY5" fmla="*/ 1973734 h 3287776"/>
+              <a:gd name="connsiteX6" fmla="*/ 5926478 w 5933642"/>
+              <a:gd name="connsiteY6" fmla="*/ 1848547 h 3287776"/>
+              <a:gd name="connsiteX0" fmla="*/ 0 w 5926478"/>
+              <a:gd name="connsiteY0" fmla="*/ 707363 h 3287776"/>
+              <a:gd name="connsiteX1" fmla="*/ 1048026 w 5926478"/>
+              <a:gd name="connsiteY1" fmla="*/ 774491 h 3287776"/>
+              <a:gd name="connsiteX2" fmla="*/ 1639509 w 5926478"/>
+              <a:gd name="connsiteY2" fmla="*/ 1699777 h 3287776"/>
+              <a:gd name="connsiteX3" fmla="*/ 2795209 w 5926478"/>
+              <a:gd name="connsiteY3" fmla="*/ 23377 h 3287776"/>
+              <a:gd name="connsiteX4" fmla="*/ 4077909 w 5926478"/>
+              <a:gd name="connsiteY4" fmla="*/ 3185677 h 3287776"/>
+              <a:gd name="connsiteX5" fmla="*/ 5414190 w 5926478"/>
+              <a:gd name="connsiteY5" fmla="*/ 1973734 h 3287776"/>
+              <a:gd name="connsiteX6" fmla="*/ 5926478 w 5926478"/>
+              <a:gd name="connsiteY6" fmla="*/ 1848547 h 3287776"/>
+              <a:gd name="connsiteX0" fmla="*/ 0 w 6143737"/>
+              <a:gd name="connsiteY0" fmla="*/ 707363 h 3287776"/>
+              <a:gd name="connsiteX1" fmla="*/ 1048026 w 6143737"/>
+              <a:gd name="connsiteY1" fmla="*/ 774491 h 3287776"/>
+              <a:gd name="connsiteX2" fmla="*/ 1639509 w 6143737"/>
+              <a:gd name="connsiteY2" fmla="*/ 1699777 h 3287776"/>
+              <a:gd name="connsiteX3" fmla="*/ 2795209 w 6143737"/>
+              <a:gd name="connsiteY3" fmla="*/ 23377 h 3287776"/>
+              <a:gd name="connsiteX4" fmla="*/ 4077909 w 6143737"/>
+              <a:gd name="connsiteY4" fmla="*/ 3185677 h 3287776"/>
+              <a:gd name="connsiteX5" fmla="*/ 5414190 w 6143737"/>
+              <a:gd name="connsiteY5" fmla="*/ 1973734 h 3287776"/>
+              <a:gd name="connsiteX6" fmla="*/ 6143737 w 6143737"/>
+              <a:gd name="connsiteY6" fmla="*/ 1805005 h 3287776"/>
+              <a:gd name="connsiteX0" fmla="*/ 0 w 6143737"/>
+              <a:gd name="connsiteY0" fmla="*/ 707363 h 3287776"/>
+              <a:gd name="connsiteX1" fmla="*/ 1048026 w 6143737"/>
+              <a:gd name="connsiteY1" fmla="*/ 774491 h 3287776"/>
+              <a:gd name="connsiteX2" fmla="*/ 1639509 w 6143737"/>
+              <a:gd name="connsiteY2" fmla="*/ 1699777 h 3287776"/>
+              <a:gd name="connsiteX3" fmla="*/ 2795209 w 6143737"/>
+              <a:gd name="connsiteY3" fmla="*/ 23377 h 3287776"/>
+              <a:gd name="connsiteX4" fmla="*/ 4077909 w 6143737"/>
+              <a:gd name="connsiteY4" fmla="*/ 3185677 h 3287776"/>
+              <a:gd name="connsiteX5" fmla="*/ 5285809 w 6143737"/>
+              <a:gd name="connsiteY5" fmla="*/ 1973734 h 3287776"/>
+              <a:gd name="connsiteX6" fmla="*/ 6143737 w 6143737"/>
+              <a:gd name="connsiteY6" fmla="*/ 1805005 h 3287776"/>
+              <a:gd name="connsiteX0" fmla="*/ 0 w 6143737"/>
+              <a:gd name="connsiteY0" fmla="*/ 707363 h 3289616"/>
+              <a:gd name="connsiteX1" fmla="*/ 1048026 w 6143737"/>
+              <a:gd name="connsiteY1" fmla="*/ 774491 h 3289616"/>
+              <a:gd name="connsiteX2" fmla="*/ 1639509 w 6143737"/>
+              <a:gd name="connsiteY2" fmla="*/ 1699777 h 3289616"/>
+              <a:gd name="connsiteX3" fmla="*/ 2795209 w 6143737"/>
+              <a:gd name="connsiteY3" fmla="*/ 23377 h 3289616"/>
+              <a:gd name="connsiteX4" fmla="*/ 4077909 w 6143737"/>
+              <a:gd name="connsiteY4" fmla="*/ 3185677 h 3289616"/>
+              <a:gd name="connsiteX5" fmla="*/ 5335187 w 6143737"/>
+              <a:gd name="connsiteY5" fmla="*/ 2002762 h 3289616"/>
+              <a:gd name="connsiteX6" fmla="*/ 6143737 w 6143737"/>
+              <a:gd name="connsiteY6" fmla="*/ 1805005 h 3289616"/>
+              <a:gd name="connsiteX0" fmla="*/ 0 w 6143737"/>
+              <a:gd name="connsiteY0" fmla="*/ 707363 h 3307033"/>
+              <a:gd name="connsiteX1" fmla="*/ 1048026 w 6143737"/>
+              <a:gd name="connsiteY1" fmla="*/ 774491 h 3307033"/>
+              <a:gd name="connsiteX2" fmla="*/ 1639509 w 6143737"/>
+              <a:gd name="connsiteY2" fmla="*/ 1699777 h 3307033"/>
+              <a:gd name="connsiteX3" fmla="*/ 2795209 w 6143737"/>
+              <a:gd name="connsiteY3" fmla="*/ 23377 h 3307033"/>
+              <a:gd name="connsiteX4" fmla="*/ 4077909 w 6143737"/>
+              <a:gd name="connsiteY4" fmla="*/ 3185677 h 3307033"/>
+              <a:gd name="connsiteX5" fmla="*/ 5236434 w 6143737"/>
+              <a:gd name="connsiteY5" fmla="*/ 2234990 h 3307033"/>
+              <a:gd name="connsiteX6" fmla="*/ 6143737 w 6143737"/>
+              <a:gd name="connsiteY6" fmla="*/ 1805005 h 3307033"/>
+              <a:gd name="connsiteX0" fmla="*/ 0 w 6143737"/>
+              <a:gd name="connsiteY0" fmla="*/ 707363 h 3281013"/>
+              <a:gd name="connsiteX1" fmla="*/ 1048026 w 6143737"/>
+              <a:gd name="connsiteY1" fmla="*/ 774491 h 3281013"/>
+              <a:gd name="connsiteX2" fmla="*/ 1639509 w 6143737"/>
+              <a:gd name="connsiteY2" fmla="*/ 1699777 h 3281013"/>
+              <a:gd name="connsiteX3" fmla="*/ 2795209 w 6143737"/>
+              <a:gd name="connsiteY3" fmla="*/ 23377 h 3281013"/>
+              <a:gd name="connsiteX4" fmla="*/ 4077909 w 6143737"/>
+              <a:gd name="connsiteY4" fmla="*/ 3185677 h 3281013"/>
+              <a:gd name="connsiteX5" fmla="*/ 5256185 w 6143737"/>
+              <a:gd name="connsiteY5" fmla="*/ 1857619 h 3281013"/>
+              <a:gd name="connsiteX6" fmla="*/ 6143737 w 6143737"/>
+              <a:gd name="connsiteY6" fmla="*/ 1805005 h 3281013"/>
+              <a:gd name="connsiteX0" fmla="*/ 0 w 6154106"/>
+              <a:gd name="connsiteY0" fmla="*/ 707363 h 3281013"/>
+              <a:gd name="connsiteX1" fmla="*/ 1048026 w 6154106"/>
+              <a:gd name="connsiteY1" fmla="*/ 774491 h 3281013"/>
+              <a:gd name="connsiteX2" fmla="*/ 1639509 w 6154106"/>
+              <a:gd name="connsiteY2" fmla="*/ 1699777 h 3281013"/>
+              <a:gd name="connsiteX3" fmla="*/ 2795209 w 6154106"/>
+              <a:gd name="connsiteY3" fmla="*/ 23377 h 3281013"/>
+              <a:gd name="connsiteX4" fmla="*/ 4077909 w 6154106"/>
+              <a:gd name="connsiteY4" fmla="*/ 3185677 h 3281013"/>
+              <a:gd name="connsiteX5" fmla="*/ 5256185 w 6154106"/>
+              <a:gd name="connsiteY5" fmla="*/ 1857619 h 3281013"/>
+              <a:gd name="connsiteX6" fmla="*/ 6154106 w 6154106"/>
+              <a:gd name="connsiteY6" fmla="*/ 1751665 h 3281013"/>
+              <a:gd name="connsiteX0" fmla="*/ 0 w 6154106"/>
+              <a:gd name="connsiteY0" fmla="*/ 707363 h 3281013"/>
+              <a:gd name="connsiteX1" fmla="*/ 1048026 w 6154106"/>
+              <a:gd name="connsiteY1" fmla="*/ 774491 h 3281013"/>
+              <a:gd name="connsiteX2" fmla="*/ 1639509 w 6154106"/>
+              <a:gd name="connsiteY2" fmla="*/ 1699777 h 3281013"/>
+              <a:gd name="connsiteX3" fmla="*/ 2795209 w 6154106"/>
+              <a:gd name="connsiteY3" fmla="*/ 23377 h 3281013"/>
+              <a:gd name="connsiteX4" fmla="*/ 4077909 w 6154106"/>
+              <a:gd name="connsiteY4" fmla="*/ 3185677 h 3281013"/>
+              <a:gd name="connsiteX5" fmla="*/ 5256185 w 6154106"/>
+              <a:gd name="connsiteY5" fmla="*/ 1857619 h 3281013"/>
+              <a:gd name="connsiteX6" fmla="*/ 6154106 w 6154106"/>
+              <a:gd name="connsiteY6" fmla="*/ 1751665 h 3281013"/>
+              <a:gd name="connsiteX0" fmla="*/ 0 w 6154106"/>
+              <a:gd name="connsiteY0" fmla="*/ 707363 h 3281013"/>
+              <a:gd name="connsiteX1" fmla="*/ 1048026 w 6154106"/>
+              <a:gd name="connsiteY1" fmla="*/ 774491 h 3281013"/>
+              <a:gd name="connsiteX2" fmla="*/ 1639509 w 6154106"/>
+              <a:gd name="connsiteY2" fmla="*/ 1699777 h 3281013"/>
+              <a:gd name="connsiteX3" fmla="*/ 2795209 w 6154106"/>
+              <a:gd name="connsiteY3" fmla="*/ 23377 h 3281013"/>
+              <a:gd name="connsiteX4" fmla="*/ 4077909 w 6154106"/>
+              <a:gd name="connsiteY4" fmla="*/ 3185677 h 3281013"/>
+              <a:gd name="connsiteX5" fmla="*/ 5256185 w 6154106"/>
+              <a:gd name="connsiteY5" fmla="*/ 1857619 h 3281013"/>
+              <a:gd name="connsiteX6" fmla="*/ 6154106 w 6154106"/>
+              <a:gd name="connsiteY6" fmla="*/ 1751665 h 3281013"/>
+              <a:gd name="connsiteX0" fmla="*/ 0 w 6154106"/>
+              <a:gd name="connsiteY0" fmla="*/ 707392 h 3281042"/>
+              <a:gd name="connsiteX1" fmla="*/ 996180 w 6154106"/>
+              <a:gd name="connsiteY1" fmla="*/ 789760 h 3281042"/>
+              <a:gd name="connsiteX2" fmla="*/ 1639509 w 6154106"/>
+              <a:gd name="connsiteY2" fmla="*/ 1699806 h 3281042"/>
+              <a:gd name="connsiteX3" fmla="*/ 2795209 w 6154106"/>
+              <a:gd name="connsiteY3" fmla="*/ 23406 h 3281042"/>
+              <a:gd name="connsiteX4" fmla="*/ 4077909 w 6154106"/>
+              <a:gd name="connsiteY4" fmla="*/ 3185706 h 3281042"/>
+              <a:gd name="connsiteX5" fmla="*/ 5256185 w 6154106"/>
+              <a:gd name="connsiteY5" fmla="*/ 1857648 h 3281042"/>
+              <a:gd name="connsiteX6" fmla="*/ 6154106 w 6154106"/>
+              <a:gd name="connsiteY6" fmla="*/ 1751694 h 3281042"/>
+              <a:gd name="connsiteX0" fmla="*/ 0 w 6154106"/>
+              <a:gd name="connsiteY0" fmla="*/ 707392 h 3281042"/>
+              <a:gd name="connsiteX1" fmla="*/ 996180 w 6154106"/>
+              <a:gd name="connsiteY1" fmla="*/ 789760 h 3281042"/>
+              <a:gd name="connsiteX2" fmla="*/ 1639509 w 6154106"/>
+              <a:gd name="connsiteY2" fmla="*/ 1699806 h 3281042"/>
+              <a:gd name="connsiteX3" fmla="*/ 2795209 w 6154106"/>
+              <a:gd name="connsiteY3" fmla="*/ 23406 h 3281042"/>
+              <a:gd name="connsiteX4" fmla="*/ 4077909 w 6154106"/>
+              <a:gd name="connsiteY4" fmla="*/ 3185706 h 3281042"/>
+              <a:gd name="connsiteX5" fmla="*/ 5256185 w 6154106"/>
+              <a:gd name="connsiteY5" fmla="*/ 1857648 h 3281042"/>
+              <a:gd name="connsiteX6" fmla="*/ 6154106 w 6154106"/>
+              <a:gd name="connsiteY6" fmla="*/ 1751694 h 3281042"/>
+              <a:gd name="connsiteX0" fmla="*/ 0 w 6154106"/>
+              <a:gd name="connsiteY0" fmla="*/ 707392 h 3281042"/>
+              <a:gd name="connsiteX1" fmla="*/ 996180 w 6154106"/>
+              <a:gd name="connsiteY1" fmla="*/ 789760 h 3281042"/>
+              <a:gd name="connsiteX2" fmla="*/ 1639509 w 6154106"/>
+              <a:gd name="connsiteY2" fmla="*/ 1699806 h 3281042"/>
+              <a:gd name="connsiteX3" fmla="*/ 2795209 w 6154106"/>
+              <a:gd name="connsiteY3" fmla="*/ 23406 h 3281042"/>
+              <a:gd name="connsiteX4" fmla="*/ 4077909 w 6154106"/>
+              <a:gd name="connsiteY4" fmla="*/ 3185706 h 3281042"/>
+              <a:gd name="connsiteX5" fmla="*/ 5256185 w 6154106"/>
+              <a:gd name="connsiteY5" fmla="*/ 1857648 h 3281042"/>
+              <a:gd name="connsiteX6" fmla="*/ 6154106 w 6154106"/>
+              <a:gd name="connsiteY6" fmla="*/ 1751694 h 3281042"/>
+              <a:gd name="connsiteX0" fmla="*/ 0 w 6154106"/>
+              <a:gd name="connsiteY0" fmla="*/ 707392 h 3281042"/>
+              <a:gd name="connsiteX1" fmla="*/ 996180 w 6154106"/>
+              <a:gd name="connsiteY1" fmla="*/ 789760 h 3281042"/>
+              <a:gd name="connsiteX2" fmla="*/ 1639509 w 6154106"/>
+              <a:gd name="connsiteY2" fmla="*/ 1699806 h 3281042"/>
+              <a:gd name="connsiteX3" fmla="*/ 2795209 w 6154106"/>
+              <a:gd name="connsiteY3" fmla="*/ 23406 h 3281042"/>
+              <a:gd name="connsiteX4" fmla="*/ 4077909 w 6154106"/>
+              <a:gd name="connsiteY4" fmla="*/ 3185706 h 3281042"/>
+              <a:gd name="connsiteX5" fmla="*/ 5256185 w 6154106"/>
+              <a:gd name="connsiteY5" fmla="*/ 1857648 h 3281042"/>
+              <a:gd name="connsiteX6" fmla="*/ 6154106 w 6154106"/>
+              <a:gd name="connsiteY6" fmla="*/ 1751694 h 3281042"/>
+              <a:gd name="connsiteX0" fmla="*/ 0 w 6154106"/>
+              <a:gd name="connsiteY0" fmla="*/ 707392 h 3281042"/>
+              <a:gd name="connsiteX1" fmla="*/ 996180 w 6154106"/>
+              <a:gd name="connsiteY1" fmla="*/ 789760 h 3281042"/>
+              <a:gd name="connsiteX2" fmla="*/ 1639509 w 6154106"/>
+              <a:gd name="connsiteY2" fmla="*/ 1699806 h 3281042"/>
+              <a:gd name="connsiteX3" fmla="*/ 2795209 w 6154106"/>
+              <a:gd name="connsiteY3" fmla="*/ 23406 h 3281042"/>
+              <a:gd name="connsiteX4" fmla="*/ 4077909 w 6154106"/>
+              <a:gd name="connsiteY4" fmla="*/ 3185706 h 3281042"/>
+              <a:gd name="connsiteX5" fmla="*/ 5256185 w 6154106"/>
+              <a:gd name="connsiteY5" fmla="*/ 1857648 h 3281042"/>
+              <a:gd name="connsiteX6" fmla="*/ 6154106 w 6154106"/>
+              <a:gd name="connsiteY6" fmla="*/ 1751694 h 3281042"/>
             </a:gdLst>
             <a:ahLst/>
             <a:cxnLst>
@@ -3134,32 +3467,48 @@
               <a:cxn ang="0">
                 <a:pos x="connsiteX4" y="connsiteY4"/>
               </a:cxn>
+              <a:cxn ang="0">
+                <a:pos x="connsiteX5" y="connsiteY5"/>
+              </a:cxn>
+              <a:cxn ang="0">
+                <a:pos x="connsiteX6" y="connsiteY6"/>
+              </a:cxn>
             </a:cxnLst>
             <a:rect l="l" t="t" r="r" b="b"/>
             <a:pathLst>
-              <a:path w="4406900" h="3393921">
+              <a:path w="6154106" h="3281042">
                 <a:moveTo>
-                  <a:pt x="0" y="1027174"/>
+                  <a:pt x="0" y="707392"/>
                 </a:moveTo>
                 <a:cubicBezTo>
-                  <a:pt x="237066" y="1447332"/>
-                  <a:pt x="474133" y="1867491"/>
-                  <a:pt x="800100" y="1700274"/>
+                  <a:pt x="149777" y="700891"/>
+                  <a:pt x="793702" y="648549"/>
+                  <a:pt x="996180" y="789760"/>
                 </a:cubicBezTo>
                 <a:cubicBezTo>
-                  <a:pt x="1126067" y="1533057"/>
-                  <a:pt x="1549400" y="-223776"/>
-                  <a:pt x="1955800" y="23874"/>
+                  <a:pt x="1222853" y="947663"/>
+                  <a:pt x="1339671" y="1827532"/>
+                  <a:pt x="1639509" y="1699806"/>
                 </a:cubicBezTo>
                 <a:cubicBezTo>
-                  <a:pt x="2362200" y="271524"/>
-                  <a:pt x="2829983" y="2718391"/>
-                  <a:pt x="3238500" y="3186174"/>
+                  <a:pt x="1939347" y="1572080"/>
+                  <a:pt x="2388809" y="-224244"/>
+                  <a:pt x="2795209" y="23406"/>
                 </a:cubicBezTo>
                 <a:cubicBezTo>
-                  <a:pt x="3647017" y="3653957"/>
-                  <a:pt x="4026958" y="3242265"/>
-                  <a:pt x="4406900" y="2830574"/>
+                  <a:pt x="3201609" y="271056"/>
+                  <a:pt x="3669392" y="2717923"/>
+                  <a:pt x="4077909" y="3185706"/>
+                </a:cubicBezTo>
+                <a:cubicBezTo>
+                  <a:pt x="4486426" y="3653489"/>
+                  <a:pt x="4876243" y="2269339"/>
+                  <a:pt x="5256185" y="1857648"/>
+                </a:cubicBezTo>
+                <a:cubicBezTo>
+                  <a:pt x="5353441" y="1715952"/>
+                  <a:pt x="5834564" y="1768219"/>
+                  <a:pt x="6154106" y="1751694"/>
                 </a:cubicBezTo>
               </a:path>
             </a:pathLst>
@@ -3185,7 +3534,7 @@
           <a:lstStyle/>
           <a:p>
             <a:pPr algn="ctr"/>
-            <a:endParaRPr lang="en-US"/>
+            <a:endParaRPr lang="en-US" dirty="0"/>
           </a:p>
         </p:txBody>
       </p:sp>
@@ -3197,7 +3546,7 @@
         </p:nvCxnSpPr>
         <p:spPr>
           <a:xfrm>
-            <a:off x="3521529" y="4104822"/>
+            <a:off x="4842328" y="4104822"/>
             <a:ext cx="2527300" cy="0"/>
           </a:xfrm>
           <a:prstGeom prst="line">
@@ -3230,7 +3579,7 @@
         </p:nvCxnSpPr>
         <p:spPr>
           <a:xfrm>
-            <a:off x="5251269" y="5761639"/>
+            <a:off x="6484983" y="5648371"/>
             <a:ext cx="2527300" cy="0"/>
           </a:xfrm>
           <a:prstGeom prst="line">
@@ -3263,7 +3612,7 @@
         </p:nvCxnSpPr>
         <p:spPr>
           <a:xfrm flipV="1">
-            <a:off x="5337629" y="2360098"/>
+            <a:off x="6658428" y="2360098"/>
             <a:ext cx="0" cy="1744724"/>
           </a:xfrm>
           <a:prstGeom prst="straightConnector1">
@@ -3299,8 +3648,8 @@
         </p:nvCxnSpPr>
         <p:spPr>
           <a:xfrm>
-            <a:off x="6099629" y="4104822"/>
-            <a:ext cx="0" cy="1656817"/>
+            <a:off x="7420428" y="4104822"/>
+            <a:ext cx="0" cy="1543549"/>
           </a:xfrm>
           <a:prstGeom prst="straightConnector1">
             <a:avLst/>
@@ -3327,93 +3676,6 @@
           </a:fontRef>
         </p:style>
       </p:cxnSp>
-      <p:sp>
-        <p:nvSpPr>
-          <p:cNvPr id="20" name="TextBox 19"/>
-          <p:cNvSpPr txBox="1"/>
-          <p:nvPr/>
-        </p:nvSpPr>
-        <p:spPr>
-          <a:xfrm>
-            <a:off x="3377596" y="3726890"/>
-            <a:ext cx="368300" cy="377932"/>
-          </a:xfrm>
-          <a:prstGeom prst="rect">
-            <a:avLst/>
-          </a:prstGeom>
-          <a:noFill/>
-        </p:spPr>
-        <p:txBody>
-          <a:bodyPr wrap="square" rtlCol="0">
-            <a:spAutoFit/>
-          </a:bodyPr>
-          <a:lstStyle/>
-          <a:p>
-            <a:r>
-              <a:rPr lang="en-US" b="1" dirty="0"/>
-              <a:t>A</a:t>
-            </a:r>
-          </a:p>
-        </p:txBody>
-      </p:sp>
-      <p:sp>
-        <p:nvSpPr>
-          <p:cNvPr id="21" name="TextBox 20"/>
-          <p:cNvSpPr txBox="1"/>
-          <p:nvPr/>
-        </p:nvSpPr>
-        <p:spPr>
-          <a:xfrm>
-            <a:off x="5275642" y="2360097"/>
-            <a:ext cx="368300" cy="377932"/>
-          </a:xfrm>
-          <a:prstGeom prst="rect">
-            <a:avLst/>
-          </a:prstGeom>
-          <a:noFill/>
-        </p:spPr>
-        <p:txBody>
-          <a:bodyPr wrap="square" rtlCol="0">
-            <a:spAutoFit/>
-          </a:bodyPr>
-          <a:lstStyle/>
-          <a:p>
-            <a:r>
-              <a:rPr lang="en-US" b="1" dirty="0"/>
-              <a:t>B</a:t>
-            </a:r>
-          </a:p>
-        </p:txBody>
-      </p:sp>
-      <p:sp>
-        <p:nvSpPr>
-          <p:cNvPr id="22" name="TextBox 21"/>
-          <p:cNvSpPr txBox="1"/>
-          <p:nvPr/>
-        </p:nvSpPr>
-        <p:spPr>
-          <a:xfrm>
-            <a:off x="7710263" y="5433182"/>
-            <a:ext cx="368300" cy="377932"/>
-          </a:xfrm>
-          <a:prstGeom prst="rect">
-            <a:avLst/>
-          </a:prstGeom>
-          <a:noFill/>
-        </p:spPr>
-        <p:txBody>
-          <a:bodyPr wrap="square" rtlCol="0">
-            <a:spAutoFit/>
-          </a:bodyPr>
-          <a:lstStyle/>
-          <a:p>
-            <a:r>
-              <a:rPr lang="en-US" b="1" dirty="0"/>
-              <a:t>C</a:t>
-            </a:r>
-          </a:p>
-        </p:txBody>
-      </p:sp>
       <mc:AlternateContent xmlns:mc="http://schemas.openxmlformats.org/markup-compatibility/2006">
         <mc:Choice xmlns:a14="http://schemas.microsoft.com/office/drawing/2010/main" Requires="a14">
           <p:sp>
@@ -3424,7 +3686,7 @@
             </p:nvSpPr>
             <p:spPr>
               <a:xfrm>
-                <a:off x="5384075" y="3298731"/>
+                <a:off x="6704874" y="3298731"/>
                 <a:ext cx="509178" cy="314766"/>
               </a:xfrm>
               <a:prstGeom prst="rect">
@@ -3438,6 +3700,7 @@
               </a:bodyPr>
               <a:lstStyle/>
               <a:p>
+                <a:pPr/>
                 <a14:m>
                   <m:oMathPara xmlns:m="http://schemas.openxmlformats.org/officeDocument/2006/math">
                     <m:oMathParaPr>
@@ -3494,7 +3757,7 @@
             </p:nvSpPr>
             <p:spPr>
               <a:xfrm>
-                <a:off x="5384075" y="3298731"/>
+                <a:off x="6704874" y="3298731"/>
                 <a:ext cx="509178" cy="314766"/>
               </a:xfrm>
               <a:prstGeom prst="rect">
@@ -3503,7 +3766,7 @@
               <a:blipFill>
                 <a:blip r:embed="rId2"/>
                 <a:stretch>
-                  <a:fillRect l="-10714" t="-3846" r="-7143" b="-7692"/>
+                  <a:fillRect l="-12048" t="-3846" r="-8434" b="-7692"/>
                 </a:stretch>
               </a:blipFill>
             </p:spPr>
@@ -3532,7 +3795,7 @@
             </p:nvSpPr>
             <p:spPr>
               <a:xfrm>
-                <a:off x="5590451" y="4772038"/>
+                <a:off x="6911250" y="4772038"/>
                 <a:ext cx="402354" cy="307777"/>
               </a:xfrm>
               <a:prstGeom prst="rect">
@@ -3546,6 +3809,7 @@
               </a:bodyPr>
               <a:lstStyle/>
               <a:p>
+                <a:pPr/>
                 <a14:m>
                   <m:oMathPara xmlns:m="http://schemas.openxmlformats.org/officeDocument/2006/math">
                     <m:oMathParaPr>
@@ -3583,7 +3847,7 @@
             </p:nvSpPr>
             <p:spPr>
               <a:xfrm>
-                <a:off x="5590451" y="4772038"/>
+                <a:off x="6911250" y="4772038"/>
                 <a:ext cx="402354" cy="307777"/>
               </a:xfrm>
               <a:prstGeom prst="rect">
@@ -3592,7 +3856,7 @@
               <a:blipFill>
                 <a:blip r:embed="rId3"/>
                 <a:stretch>
-                  <a:fillRect l="-13636" r="-15152" b="-6000"/>
+                  <a:fillRect l="-15152" r="-13636" b="-6000"/>
                 </a:stretch>
               </a:blipFill>
             </p:spPr>
@@ -3611,6 +3875,163 @@
           </p:sp>
         </mc:Fallback>
       </mc:AlternateContent>
+      <p:sp>
+        <p:nvSpPr>
+          <p:cNvPr id="4" name="TextBox 3"/>
+          <p:cNvSpPr txBox="1"/>
+          <p:nvPr/>
+        </p:nvSpPr>
+        <p:spPr>
+          <a:xfrm>
+            <a:off x="2653425" y="2714172"/>
+            <a:ext cx="1121076" cy="369332"/>
+          </a:xfrm>
+          <a:prstGeom prst="rect">
+            <a:avLst/>
+          </a:prstGeom>
+          <a:noFill/>
+        </p:spPr>
+        <p:txBody>
+          <a:bodyPr wrap="none" rtlCol="0">
+            <a:spAutoFit/>
+          </a:bodyPr>
+          <a:lstStyle/>
+          <a:p>
+            <a:r>
+              <a:rPr lang="en-US" b="1" dirty="0"/>
+              <a:t>Reactants</a:t>
+            </a:r>
+          </a:p>
+        </p:txBody>
+      </p:sp>
+      <p:sp>
+        <p:nvSpPr>
+          <p:cNvPr id="19" name="TextBox 18"/>
+          <p:cNvSpPr txBox="1"/>
+          <p:nvPr/>
+        </p:nvSpPr>
+        <p:spPr>
+          <a:xfrm>
+            <a:off x="10772133" y="3819817"/>
+            <a:ext cx="1025024" cy="369332"/>
+          </a:xfrm>
+          <a:prstGeom prst="rect">
+            <a:avLst/>
+          </a:prstGeom>
+          <a:noFill/>
+        </p:spPr>
+        <p:txBody>
+          <a:bodyPr wrap="none" rtlCol="0">
+            <a:spAutoFit/>
+          </a:bodyPr>
+          <a:lstStyle/>
+          <a:p>
+            <a:r>
+              <a:rPr lang="en-US" b="1" dirty="0"/>
+              <a:t>Products</a:t>
+            </a:r>
+          </a:p>
+        </p:txBody>
+      </p:sp>
+      <p:sp>
+        <p:nvSpPr>
+          <p:cNvPr id="23" name="TextBox 22"/>
+          <p:cNvSpPr txBox="1"/>
+          <p:nvPr/>
+        </p:nvSpPr>
+        <p:spPr>
+          <a:xfrm>
+            <a:off x="6013828" y="1949227"/>
+            <a:ext cx="1289199" cy="369332"/>
+          </a:xfrm>
+          <a:prstGeom prst="rect">
+            <a:avLst/>
+          </a:prstGeom>
+          <a:noFill/>
+        </p:spPr>
+        <p:txBody>
+          <a:bodyPr wrap="none" rtlCol="0">
+            <a:spAutoFit/>
+          </a:bodyPr>
+          <a:lstStyle/>
+          <a:p>
+            <a:r>
+              <a:rPr lang="en-US" b="1" dirty="0"/>
+              <a:t>TS Complex</a:t>
+            </a:r>
+          </a:p>
+        </p:txBody>
+      </p:sp>
+      <p:sp>
+        <p:nvSpPr>
+          <p:cNvPr id="24" name="TextBox 23"/>
+          <p:cNvSpPr txBox="1"/>
+          <p:nvPr/>
+        </p:nvSpPr>
+        <p:spPr>
+          <a:xfrm>
+            <a:off x="4174447" y="4087159"/>
+            <a:ext cx="1408206" cy="646331"/>
+          </a:xfrm>
+          <a:prstGeom prst="rect">
+            <a:avLst/>
+          </a:prstGeom>
+          <a:noFill/>
+        </p:spPr>
+        <p:txBody>
+          <a:bodyPr wrap="none" rtlCol="0">
+            <a:spAutoFit/>
+          </a:bodyPr>
+          <a:lstStyle/>
+          <a:p>
+            <a:r>
+              <a:rPr lang="en-US" b="1" dirty="0"/>
+              <a:t>Pre-Reaction</a:t>
+            </a:r>
+          </a:p>
+          <a:p>
+            <a:r>
+              <a:rPr lang="en-US" b="1" dirty="0"/>
+              <a:t>Complex</a:t>
+            </a:r>
+          </a:p>
+        </p:txBody>
+      </p:sp>
+      <p:sp>
+        <p:nvSpPr>
+          <p:cNvPr id="27" name="TextBox 26"/>
+          <p:cNvSpPr txBox="1"/>
+          <p:nvPr/>
+        </p:nvSpPr>
+        <p:spPr>
+          <a:xfrm>
+            <a:off x="8345145" y="4733490"/>
+            <a:ext cx="1502271" cy="646331"/>
+          </a:xfrm>
+          <a:prstGeom prst="rect">
+            <a:avLst/>
+          </a:prstGeom>
+          <a:noFill/>
+        </p:spPr>
+        <p:txBody>
+          <a:bodyPr wrap="none" rtlCol="0">
+            <a:spAutoFit/>
+          </a:bodyPr>
+          <a:lstStyle/>
+          <a:p>
+            <a:r>
+              <a:rPr lang="en-US" b="1" dirty="0"/>
+              <a:t>Post-Reaction</a:t>
+            </a:r>
+          </a:p>
+          <a:p>
+            <a:r>
+              <a:rPr lang="en-US" b="1" dirty="0"/>
+              <a:t>Complex</a:t>
+            </a:r>
+          </a:p>
+        </p:txBody>
+      </p:sp>
     </p:spTree>
     <p:extLst>
       <p:ext uri="{BB962C8B-B14F-4D97-AF65-F5344CB8AC3E}">

</xml_diff>